<commit_message>
added powerpoint and pdf
</commit_message>
<xml_diff>
--- a/Study Staurday - w2.pptx
+++ b/Study Staurday - w2.pptx
@@ -264,7 +264,7 @@
           <a:p>
             <a:fld id="{00662177-2CA0-4843-8C19-73F5643914DD}" type="datetimeFigureOut">
               <a:rPr lang="en-US" smtClean="0"/>
-              <a:t>8/29/18</a:t>
+              <a:t>9/22/18</a:t>
             </a:fld>
             <a:endParaRPr lang="en-US"/>
           </a:p>
@@ -462,7 +462,7 @@
           <a:p>
             <a:fld id="{00662177-2CA0-4843-8C19-73F5643914DD}" type="datetimeFigureOut">
               <a:rPr lang="en-US" smtClean="0"/>
-              <a:t>8/29/18</a:t>
+              <a:t>9/22/18</a:t>
             </a:fld>
             <a:endParaRPr lang="en-US"/>
           </a:p>
@@ -670,7 +670,7 @@
           <a:p>
             <a:fld id="{00662177-2CA0-4843-8C19-73F5643914DD}" type="datetimeFigureOut">
               <a:rPr lang="en-US" smtClean="0"/>
-              <a:t>8/29/18</a:t>
+              <a:t>9/22/18</a:t>
             </a:fld>
             <a:endParaRPr lang="en-US"/>
           </a:p>
@@ -868,7 +868,7 @@
           <a:p>
             <a:fld id="{00662177-2CA0-4843-8C19-73F5643914DD}" type="datetimeFigureOut">
               <a:rPr lang="en-US" smtClean="0"/>
-              <a:t>8/29/18</a:t>
+              <a:t>9/22/18</a:t>
             </a:fld>
             <a:endParaRPr lang="en-US"/>
           </a:p>
@@ -1143,7 +1143,7 @@
           <a:p>
             <a:fld id="{00662177-2CA0-4843-8C19-73F5643914DD}" type="datetimeFigureOut">
               <a:rPr lang="en-US" smtClean="0"/>
-              <a:t>8/29/18</a:t>
+              <a:t>9/22/18</a:t>
             </a:fld>
             <a:endParaRPr lang="en-US"/>
           </a:p>
@@ -1408,7 +1408,7 @@
           <a:p>
             <a:fld id="{00662177-2CA0-4843-8C19-73F5643914DD}" type="datetimeFigureOut">
               <a:rPr lang="en-US" smtClean="0"/>
-              <a:t>8/29/18</a:t>
+              <a:t>9/22/18</a:t>
             </a:fld>
             <a:endParaRPr lang="en-US"/>
           </a:p>
@@ -1820,7 +1820,7 @@
           <a:p>
             <a:fld id="{00662177-2CA0-4843-8C19-73F5643914DD}" type="datetimeFigureOut">
               <a:rPr lang="en-US" smtClean="0"/>
-              <a:t>8/29/18</a:t>
+              <a:t>9/22/18</a:t>
             </a:fld>
             <a:endParaRPr lang="en-US"/>
           </a:p>
@@ -1961,7 +1961,7 @@
           <a:p>
             <a:fld id="{00662177-2CA0-4843-8C19-73F5643914DD}" type="datetimeFigureOut">
               <a:rPr lang="en-US" smtClean="0"/>
-              <a:t>8/29/18</a:t>
+              <a:t>9/22/18</a:t>
             </a:fld>
             <a:endParaRPr lang="en-US"/>
           </a:p>
@@ -2074,7 +2074,7 @@
           <a:p>
             <a:fld id="{00662177-2CA0-4843-8C19-73F5643914DD}" type="datetimeFigureOut">
               <a:rPr lang="en-US" smtClean="0"/>
-              <a:t>8/29/18</a:t>
+              <a:t>9/22/18</a:t>
             </a:fld>
             <a:endParaRPr lang="en-US"/>
           </a:p>
@@ -2385,7 +2385,7 @@
           <a:p>
             <a:fld id="{00662177-2CA0-4843-8C19-73F5643914DD}" type="datetimeFigureOut">
               <a:rPr lang="en-US" smtClean="0"/>
-              <a:t>8/29/18</a:t>
+              <a:t>9/22/18</a:t>
             </a:fld>
             <a:endParaRPr lang="en-US"/>
           </a:p>
@@ -2673,7 +2673,7 @@
           <a:p>
             <a:fld id="{00662177-2CA0-4843-8C19-73F5643914DD}" type="datetimeFigureOut">
               <a:rPr lang="en-US" smtClean="0"/>
-              <a:t>8/29/18</a:t>
+              <a:t>9/22/18</a:t>
             </a:fld>
             <a:endParaRPr lang="en-US"/>
           </a:p>
@@ -2914,7 +2914,7 @@
           <a:p>
             <a:fld id="{00662177-2CA0-4843-8C19-73F5643914DD}" type="datetimeFigureOut">
               <a:rPr lang="en-US" smtClean="0"/>
-              <a:t>8/29/18</a:t>
+              <a:t>9/22/18</a:t>
             </a:fld>
             <a:endParaRPr lang="en-US"/>
           </a:p>
@@ -3511,7 +3511,7 @@
             </a:pPr>
             <a:r>
               <a:rPr lang="en-US" dirty="0" err="1"/>
-              <a:t>Npm</a:t>
+              <a:t>npm</a:t>
             </a:r>
             <a:r>
               <a:rPr lang="en-US" dirty="0"/>

</xml_diff>

<commit_message>
updated ppt and pdf
</commit_message>
<xml_diff>
--- a/Study Staurday - w2.pptx
+++ b/Study Staurday - w2.pptx
@@ -264,7 +264,7 @@
           <a:p>
             <a:fld id="{00662177-2CA0-4843-8C19-73F5643914DD}" type="datetimeFigureOut">
               <a:rPr lang="en-US" smtClean="0"/>
-              <a:t>9/22/18</a:t>
+              <a:t>9/27/18</a:t>
             </a:fld>
             <a:endParaRPr lang="en-US"/>
           </a:p>
@@ -462,7 +462,7 @@
           <a:p>
             <a:fld id="{00662177-2CA0-4843-8C19-73F5643914DD}" type="datetimeFigureOut">
               <a:rPr lang="en-US" smtClean="0"/>
-              <a:t>9/22/18</a:t>
+              <a:t>9/27/18</a:t>
             </a:fld>
             <a:endParaRPr lang="en-US"/>
           </a:p>
@@ -670,7 +670,7 @@
           <a:p>
             <a:fld id="{00662177-2CA0-4843-8C19-73F5643914DD}" type="datetimeFigureOut">
               <a:rPr lang="en-US" smtClean="0"/>
-              <a:t>9/22/18</a:t>
+              <a:t>9/27/18</a:t>
             </a:fld>
             <a:endParaRPr lang="en-US"/>
           </a:p>
@@ -868,7 +868,7 @@
           <a:p>
             <a:fld id="{00662177-2CA0-4843-8C19-73F5643914DD}" type="datetimeFigureOut">
               <a:rPr lang="en-US" smtClean="0"/>
-              <a:t>9/22/18</a:t>
+              <a:t>9/27/18</a:t>
             </a:fld>
             <a:endParaRPr lang="en-US"/>
           </a:p>
@@ -1143,7 +1143,7 @@
           <a:p>
             <a:fld id="{00662177-2CA0-4843-8C19-73F5643914DD}" type="datetimeFigureOut">
               <a:rPr lang="en-US" smtClean="0"/>
-              <a:t>9/22/18</a:t>
+              <a:t>9/27/18</a:t>
             </a:fld>
             <a:endParaRPr lang="en-US"/>
           </a:p>
@@ -1408,7 +1408,7 @@
           <a:p>
             <a:fld id="{00662177-2CA0-4843-8C19-73F5643914DD}" type="datetimeFigureOut">
               <a:rPr lang="en-US" smtClean="0"/>
-              <a:t>9/22/18</a:t>
+              <a:t>9/27/18</a:t>
             </a:fld>
             <a:endParaRPr lang="en-US"/>
           </a:p>
@@ -1820,7 +1820,7 @@
           <a:p>
             <a:fld id="{00662177-2CA0-4843-8C19-73F5643914DD}" type="datetimeFigureOut">
               <a:rPr lang="en-US" smtClean="0"/>
-              <a:t>9/22/18</a:t>
+              <a:t>9/27/18</a:t>
             </a:fld>
             <a:endParaRPr lang="en-US"/>
           </a:p>
@@ -1961,7 +1961,7 @@
           <a:p>
             <a:fld id="{00662177-2CA0-4843-8C19-73F5643914DD}" type="datetimeFigureOut">
               <a:rPr lang="en-US" smtClean="0"/>
-              <a:t>9/22/18</a:t>
+              <a:t>9/27/18</a:t>
             </a:fld>
             <a:endParaRPr lang="en-US"/>
           </a:p>
@@ -2074,7 +2074,7 @@
           <a:p>
             <a:fld id="{00662177-2CA0-4843-8C19-73F5643914DD}" type="datetimeFigureOut">
               <a:rPr lang="en-US" smtClean="0"/>
-              <a:t>9/22/18</a:t>
+              <a:t>9/27/18</a:t>
             </a:fld>
             <a:endParaRPr lang="en-US"/>
           </a:p>
@@ -2385,7 +2385,7 @@
           <a:p>
             <a:fld id="{00662177-2CA0-4843-8C19-73F5643914DD}" type="datetimeFigureOut">
               <a:rPr lang="en-US" smtClean="0"/>
-              <a:t>9/22/18</a:t>
+              <a:t>9/27/18</a:t>
             </a:fld>
             <a:endParaRPr lang="en-US"/>
           </a:p>
@@ -2673,7 +2673,7 @@
           <a:p>
             <a:fld id="{00662177-2CA0-4843-8C19-73F5643914DD}" type="datetimeFigureOut">
               <a:rPr lang="en-US" smtClean="0"/>
-              <a:t>9/22/18</a:t>
+              <a:t>9/27/18</a:t>
             </a:fld>
             <a:endParaRPr lang="en-US"/>
           </a:p>
@@ -2914,7 +2914,7 @@
           <a:p>
             <a:fld id="{00662177-2CA0-4843-8C19-73F5643914DD}" type="datetimeFigureOut">
               <a:rPr lang="en-US" smtClean="0"/>
-              <a:t>9/22/18</a:t>
+              <a:t>9/27/18</a:t>
             </a:fld>
             <a:endParaRPr lang="en-US"/>
           </a:p>
@@ -3437,7 +3437,7 @@
           <a:p>
             <a:r>
               <a:rPr lang="en-US" dirty="0"/>
-              <a:t>Were you here Last Saturday?</a:t>
+              <a:t>Welcome to Study Saturday!</a:t>
             </a:r>
           </a:p>
         </p:txBody>
@@ -3467,7 +3467,7 @@
           <a:p>
             <a:r>
               <a:rPr lang="en-US" dirty="0"/>
-              <a:t>If not, then follow these steps:</a:t>
+              <a:t>Follow these steps:</a:t>
             </a:r>
           </a:p>
           <a:p>
@@ -3476,8 +3476,12 @@
               <a:buChar char="Ø"/>
             </a:pPr>
             <a:r>
+              <a:rPr lang="en-US"/>
+              <a:t> Fork &amp; Clone </a:t>
+            </a:r>
+            <a:r>
               <a:rPr lang="en-US" dirty="0"/>
-              <a:t> Clone repo: </a:t>
+              <a:t>repo: </a:t>
             </a:r>
             <a:r>
               <a:rPr lang="en-US" dirty="0">

</xml_diff>